<commit_message>
update week 2 ppt
</commit_message>
<xml_diff>
--- a/2019/slides/week2_1.pptx
+++ b/2019/slides/week2_1.pptx
@@ -9547,6 +9547,42 @@
           </a:p>
         </p:txBody>
       </p:sp>
+      <p:pic>
+        <p:nvPicPr>
+          <p:cNvPr id="5" name="圖片 4">
+            <a:extLst>
+              <a:ext uri="{FF2B5EF4-FFF2-40B4-BE49-F238E27FC236}">
+                <a16:creationId xmlns:a16="http://schemas.microsoft.com/office/drawing/2014/main" id="{DD8F8D64-4029-4DC5-98BE-0BCA46A02708}"/>
+              </a:ext>
+            </a:extLst>
+          </p:cNvPr>
+          <p:cNvPicPr>
+            <a:picLocks noChangeAspect="1"/>
+          </p:cNvPicPr>
+          <p:nvPr/>
+        </p:nvPicPr>
+        <p:blipFill>
+          <a:blip r:embed="rId3">
+            <a:extLst>
+              <a:ext uri="{28A0092B-C50C-407E-A947-70E740481C1C}">
+                <a14:useLocalDpi xmlns:a14="http://schemas.microsoft.com/office/drawing/2010/main" val="0"/>
+              </a:ext>
+            </a:extLst>
+          </a:blip>
+          <a:stretch>
+            <a:fillRect/>
+          </a:stretch>
+        </p:blipFill>
+        <p:spPr>
+          <a:xfrm>
+            <a:off x="9598311" y="0"/>
+            <a:ext cx="2400532" cy="3050478"/>
+          </a:xfrm>
+          <a:prstGeom prst="rect">
+            <a:avLst/>
+          </a:prstGeom>
+        </p:spPr>
+      </p:pic>
     </p:spTree>
     <p:extLst>
       <p:ext uri="{BB962C8B-B14F-4D97-AF65-F5344CB8AC3E}">
@@ -24808,6 +24844,42 @@
           </a:p>
         </p:txBody>
       </p:sp>
+      <p:pic>
+        <p:nvPicPr>
+          <p:cNvPr id="5" name="圖片 4">
+            <a:extLst>
+              <a:ext uri="{FF2B5EF4-FFF2-40B4-BE49-F238E27FC236}">
+                <a16:creationId xmlns:a16="http://schemas.microsoft.com/office/drawing/2014/main" id="{A8F822F2-B417-4DCC-92D6-CDAA6F51C273}"/>
+              </a:ext>
+            </a:extLst>
+          </p:cNvPr>
+          <p:cNvPicPr>
+            <a:picLocks noChangeAspect="1"/>
+          </p:cNvPicPr>
+          <p:nvPr/>
+        </p:nvPicPr>
+        <p:blipFill>
+          <a:blip r:embed="rId2">
+            <a:extLst>
+              <a:ext uri="{28A0092B-C50C-407E-A947-70E740481C1C}">
+                <a14:useLocalDpi xmlns:a14="http://schemas.microsoft.com/office/drawing/2010/main" val="0"/>
+              </a:ext>
+            </a:extLst>
+          </a:blip>
+          <a:stretch>
+            <a:fillRect/>
+          </a:stretch>
+        </p:blipFill>
+        <p:spPr>
+          <a:xfrm>
+            <a:off x="7433716" y="2536177"/>
+            <a:ext cx="3026466" cy="3429000"/>
+          </a:xfrm>
+          <a:prstGeom prst="rect">
+            <a:avLst/>
+          </a:prstGeom>
+        </p:spPr>
+      </p:pic>
     </p:spTree>
     <p:extLst>
       <p:ext uri="{BB962C8B-B14F-4D97-AF65-F5344CB8AC3E}">
@@ -24980,6 +25052,42 @@
           </a:p>
         </p:txBody>
       </p:sp>
+      <p:pic>
+        <p:nvPicPr>
+          <p:cNvPr id="4" name="圖片 3">
+            <a:extLst>
+              <a:ext uri="{FF2B5EF4-FFF2-40B4-BE49-F238E27FC236}">
+                <a16:creationId xmlns:a16="http://schemas.microsoft.com/office/drawing/2014/main" id="{0A4F6F8B-EA14-41C7-9EE5-B93FF5E4614E}"/>
+              </a:ext>
+            </a:extLst>
+          </p:cNvPr>
+          <p:cNvPicPr>
+            <a:picLocks noChangeAspect="1"/>
+          </p:cNvPicPr>
+          <p:nvPr/>
+        </p:nvPicPr>
+        <p:blipFill>
+          <a:blip r:embed="rId2">
+            <a:extLst>
+              <a:ext uri="{28A0092B-C50C-407E-A947-70E740481C1C}">
+                <a14:useLocalDpi xmlns:a14="http://schemas.microsoft.com/office/drawing/2010/main" val="0"/>
+              </a:ext>
+            </a:extLst>
+          </a:blip>
+          <a:stretch>
+            <a:fillRect/>
+          </a:stretch>
+        </p:blipFill>
+        <p:spPr>
+          <a:xfrm>
+            <a:off x="7457971" y="3184381"/>
+            <a:ext cx="3725141" cy="2992582"/>
+          </a:xfrm>
+          <a:prstGeom prst="rect">
+            <a:avLst/>
+          </a:prstGeom>
+        </p:spPr>
+      </p:pic>
     </p:spTree>
     <p:extLst>
       <p:ext uri="{BB962C8B-B14F-4D97-AF65-F5344CB8AC3E}">
@@ -27732,6 +27840,42 @@
           </a:p>
         </p:txBody>
       </p:sp>
+      <p:pic>
+        <p:nvPicPr>
+          <p:cNvPr id="5" name="圖片 4">
+            <a:extLst>
+              <a:ext uri="{FF2B5EF4-FFF2-40B4-BE49-F238E27FC236}">
+                <a16:creationId xmlns:a16="http://schemas.microsoft.com/office/drawing/2014/main" id="{C1689370-0B07-4547-BBF6-2647401E6D41}"/>
+              </a:ext>
+            </a:extLst>
+          </p:cNvPr>
+          <p:cNvPicPr>
+            <a:picLocks noChangeAspect="1"/>
+          </p:cNvPicPr>
+          <p:nvPr/>
+        </p:nvPicPr>
+        <p:blipFill>
+          <a:blip r:embed="rId2">
+            <a:extLst>
+              <a:ext uri="{28A0092B-C50C-407E-A947-70E740481C1C}">
+                <a14:useLocalDpi xmlns:a14="http://schemas.microsoft.com/office/drawing/2010/main" val="0"/>
+              </a:ext>
+            </a:extLst>
+          </a:blip>
+          <a:stretch>
+            <a:fillRect/>
+          </a:stretch>
+        </p:blipFill>
+        <p:spPr>
+          <a:xfrm>
+            <a:off x="9380443" y="235960"/>
+            <a:ext cx="2223810" cy="2909455"/>
+          </a:xfrm>
+          <a:prstGeom prst="rect">
+            <a:avLst/>
+          </a:prstGeom>
+        </p:spPr>
+      </p:pic>
     </p:spTree>
     <p:extLst>
       <p:ext uri="{BB962C8B-B14F-4D97-AF65-F5344CB8AC3E}">

</xml_diff>

<commit_message>
Adjust on week2_1.pdf, fixing format issue
</commit_message>
<xml_diff>
--- a/2019/slides/week2_1.pptx
+++ b/2019/slides/week2_1.pptx
@@ -5120,6 +5120,10 @@
           </a:bodyPr>
           <a:lstStyle/>
           <a:p>
+            <a:r>
+              <a:rPr lang="en-US" altLang="zh-TW" sz="4400" dirty="0"/>
+              <a:t/>
+            </a:r>
             <a:br>
               <a:rPr lang="en-US" altLang="zh-TW" sz="4400" dirty="0"/>
             </a:br>
@@ -5525,15 +5529,23 @@
             </a:r>
             <a:r>
               <a:rPr lang="zh-TW" altLang="en-US" dirty="0"/>
-              <a:t>            </a:t>
+              <a:t>         </a:t>
+            </a:r>
+            <a:r>
+              <a:rPr lang="en-US" altLang="zh-TW" dirty="0" smtClean="0"/>
+              <a:t>R=P [a(3</a:t>
             </a:r>
             <a:r>
               <a:rPr lang="en-US" altLang="zh-TW" dirty="0"/>
-              <a:t>R=[a(3), a(4), a(5)] </a:t>
+              <a:t>), a(4), a(5)] </a:t>
             </a:r>
             <a:br>
               <a:rPr lang="en-US" altLang="zh-TW" dirty="0"/>
             </a:br>
+            <a:r>
+              <a:rPr lang="en-US" altLang="zh-TW" dirty="0"/>
+              <a:t/>
+            </a:r>
             <a:br>
               <a:rPr lang="en-US" altLang="zh-TW" dirty="0"/>
             </a:br>
@@ -5785,15 +5797,23 @@
             </a:r>
             <a:r>
               <a:rPr lang="zh-TW" altLang="en-US" dirty="0"/>
-              <a:t>            </a:t>
+              <a:t>         </a:t>
+            </a:r>
+            <a:r>
+              <a:rPr lang="en-US" altLang="zh-TW" dirty="0" smtClean="0"/>
+              <a:t>R=P [a(3</a:t>
             </a:r>
             <a:r>
               <a:rPr lang="en-US" altLang="zh-TW" dirty="0"/>
-              <a:t>R=[a(3), a(4), a(5)] </a:t>
+              <a:t>), a(4), a(5)] </a:t>
             </a:r>
             <a:br>
               <a:rPr lang="en-US" altLang="zh-TW" dirty="0"/>
             </a:br>
+            <a:r>
+              <a:rPr lang="en-US" altLang="zh-TW" dirty="0"/>
+              <a:t/>
+            </a:r>
             <a:br>
               <a:rPr lang="en-US" altLang="zh-TW" dirty="0"/>
             </a:br>
@@ -6096,15 +6116,23 @@
             </a:r>
             <a:r>
               <a:rPr lang="zh-TW" altLang="en-US" dirty="0"/>
-              <a:t>            </a:t>
+              <a:t>         </a:t>
+            </a:r>
+            <a:r>
+              <a:rPr lang="en-US" altLang="zh-TW" dirty="0" smtClean="0"/>
+              <a:t>R=P [a(3</a:t>
             </a:r>
             <a:r>
               <a:rPr lang="en-US" altLang="zh-TW" dirty="0"/>
-              <a:t>R=[a(3), a(4), a(5)] </a:t>
+              <a:t>), a(4), a(5)] </a:t>
             </a:r>
             <a:br>
               <a:rPr lang="en-US" altLang="zh-TW" dirty="0"/>
             </a:br>
+            <a:r>
+              <a:rPr lang="en-US" altLang="zh-TW" dirty="0"/>
+              <a:t/>
+            </a:r>
             <a:br>
               <a:rPr lang="en-US" altLang="zh-TW" dirty="0"/>
             </a:br>
@@ -6415,15 +6443,23 @@
             </a:r>
             <a:r>
               <a:rPr lang="zh-TW" altLang="en-US" dirty="0"/>
-              <a:t>            </a:t>
+              <a:t>         </a:t>
+            </a:r>
+            <a:r>
+              <a:rPr lang="en-US" altLang="zh-TW" dirty="0" smtClean="0"/>
+              <a:t>R=P [a(3</a:t>
             </a:r>
             <a:r>
               <a:rPr lang="en-US" altLang="zh-TW" dirty="0"/>
-              <a:t>R=[a(3), a(4), a(5)] </a:t>
+              <a:t>), a(4), a(5)] </a:t>
             </a:r>
             <a:br>
               <a:rPr lang="en-US" altLang="zh-TW" dirty="0"/>
             </a:br>
+            <a:r>
+              <a:rPr lang="en-US" altLang="zh-TW" dirty="0"/>
+              <a:t/>
+            </a:r>
             <a:br>
               <a:rPr lang="en-US" altLang="zh-TW" dirty="0"/>
             </a:br>
@@ -6873,6 +6909,10 @@
             <a:pPr marL="0" indent="0" algn="ctr">
               <a:buNone/>
             </a:pPr>
+            <a:r>
+              <a:rPr lang="en-US" altLang="zh-TW" dirty="0"/>
+              <a:t/>
+            </a:r>
             <a:br>
               <a:rPr lang="en-US" altLang="zh-TW" dirty="0"/>
             </a:br>
@@ -7001,6 +7041,10 @@
             <a:pPr marL="0" indent="0" algn="ctr">
               <a:buNone/>
             </a:pPr>
+            <a:r>
+              <a:rPr lang="en-US" altLang="zh-TW" dirty="0"/>
+              <a:t/>
+            </a:r>
             <a:br>
               <a:rPr lang="en-US" altLang="zh-TW" dirty="0"/>
             </a:br>
@@ -23697,6 +23741,10 @@
               </a:spcAft>
               <a:buNone/>
             </a:pPr>
+            <a:r>
+              <a:rPr lang="en-US" altLang="en-US" dirty="0"/>
+              <a:t/>
+            </a:r>
             <a:br>
               <a:rPr lang="en-US" altLang="en-US" dirty="0"/>
             </a:br>
@@ -23820,6 +23868,10 @@
             <a:r>
               <a:rPr lang="en-US" altLang="en-US" dirty="0" err="1"/>
               <a:t>表示法</a:t>
+            </a:r>
+            <a:r>
+              <a:rPr lang="en-US" altLang="en-US" dirty="0"/>
+              <a:t/>
             </a:r>
             <a:br>
               <a:rPr lang="en-US" altLang="en-US" dirty="0"/>
@@ -28311,7 +28363,7 @@
         </p:spPr>
         <p:txBody>
           <a:bodyPr>
-            <a:normAutofit/>
+            <a:normAutofit lnSpcReduction="10000"/>
           </a:bodyPr>
           <a:lstStyle/>
           <a:p>
@@ -28389,8 +28441,203 @@
               <a:t> </a:t>
             </a:r>
             <a:r>
+              <a:rPr lang="en-US" altLang="en-US" sz="3200" dirty="0" smtClean="0">
+                <a:solidFill>
+                  <a:srgbClr val="990055"/>
+                </a:solidFill>
+                <a:latin typeface="Consolas" panose="020B0609020204030204" pitchFamily="49" charset="0"/>
+                <a:ea typeface="Menlo"/>
+              </a:rPr>
+              <a:t>1</a:t>
+            </a:r>
+            <a:r>
+              <a:rPr lang="en-US" altLang="en-US" sz="3200" dirty="0" smtClean="0">
+                <a:solidFill>
+                  <a:srgbClr val="999999"/>
+                </a:solidFill>
+                <a:latin typeface="Consolas" panose="020B0609020204030204" pitchFamily="49" charset="0"/>
+                <a:ea typeface="Menlo"/>
+              </a:rPr>
+              <a:t>;</a:t>
+            </a:r>
+            <a:r>
+              <a:rPr lang="en-US" altLang="en-US" sz="3200" dirty="0" smtClean="0">
+                <a:solidFill>
+                  <a:srgbClr val="333333"/>
+                </a:solidFill>
+                <a:latin typeface="Consolas" panose="020B0609020204030204" pitchFamily="49" charset="0"/>
+                <a:ea typeface="Menlo"/>
+              </a:rPr>
+              <a:t> </a:t>
+            </a:r>
+            <a:r>
               <a:rPr lang="en-US" altLang="en-US" sz="3200" dirty="0">
                 <a:solidFill>
+                  <a:srgbClr val="333333"/>
+                </a:solidFill>
+                <a:latin typeface="Consolas" panose="020B0609020204030204" pitchFamily="49" charset="0"/>
+                <a:ea typeface="Menlo"/>
+              </a:rPr>
+              <a:t>L </a:t>
+            </a:r>
+            <a:r>
+              <a:rPr lang="en-US" altLang="en-US" sz="3200" dirty="0">
+                <a:solidFill>
+                  <a:srgbClr val="9A6E3A"/>
+                </a:solidFill>
+                <a:latin typeface="Consolas" panose="020B0609020204030204" pitchFamily="49" charset="0"/>
+                <a:ea typeface="Menlo"/>
+              </a:rPr>
+              <a:t>&lt;=</a:t>
+            </a:r>
+            <a:r>
+              <a:rPr lang="en-US" altLang="en-US" sz="3200" dirty="0">
+                <a:solidFill>
+                  <a:srgbClr val="333333"/>
+                </a:solidFill>
+                <a:latin typeface="Consolas" panose="020B0609020204030204" pitchFamily="49" charset="0"/>
+                <a:ea typeface="Menlo"/>
+              </a:rPr>
+              <a:t> N</a:t>
+            </a:r>
+            <a:r>
+              <a:rPr lang="en-US" altLang="en-US" sz="3200" dirty="0">
+                <a:solidFill>
+                  <a:srgbClr val="999999"/>
+                </a:solidFill>
+                <a:latin typeface="Consolas" panose="020B0609020204030204" pitchFamily="49" charset="0"/>
+                <a:ea typeface="Menlo"/>
+              </a:rPr>
+              <a:t>;</a:t>
+            </a:r>
+            <a:r>
+              <a:rPr lang="en-US" altLang="en-US" sz="3200" dirty="0">
+                <a:solidFill>
+                  <a:srgbClr val="333333"/>
+                </a:solidFill>
+                <a:latin typeface="Consolas" panose="020B0609020204030204" pitchFamily="49" charset="0"/>
+                <a:ea typeface="Menlo"/>
+              </a:rPr>
+              <a:t> L</a:t>
+            </a:r>
+            <a:r>
+              <a:rPr lang="en-US" altLang="en-US" sz="3200" dirty="0">
+                <a:solidFill>
+                  <a:srgbClr val="9A6E3A"/>
+                </a:solidFill>
+                <a:latin typeface="Consolas" panose="020B0609020204030204" pitchFamily="49" charset="0"/>
+                <a:ea typeface="Menlo"/>
+              </a:rPr>
+              <a:t>++</a:t>
+            </a:r>
+            <a:r>
+              <a:rPr lang="en-US" altLang="en-US" sz="3200" dirty="0">
+                <a:solidFill>
+                  <a:srgbClr val="999999"/>
+                </a:solidFill>
+                <a:latin typeface="Consolas" panose="020B0609020204030204" pitchFamily="49" charset="0"/>
+                <a:ea typeface="Menlo"/>
+              </a:rPr>
+              <a:t>) </a:t>
+            </a:r>
+            <a:r>
+              <a:rPr lang="en-US" altLang="en-US" sz="3200" dirty="0" smtClean="0">
+                <a:solidFill>
+                  <a:srgbClr val="999999"/>
+                </a:solidFill>
+                <a:latin typeface="Consolas" panose="020B0609020204030204" pitchFamily="49" charset="0"/>
+                <a:ea typeface="Menlo"/>
+              </a:rPr>
+              <a:t>{</a:t>
+            </a:r>
+          </a:p>
+          <a:p>
+            <a:pPr marL="0" indent="0">
+              <a:buNone/>
+            </a:pPr>
+            <a:r>
+              <a:rPr lang="en-US" altLang="en-US" sz="3200" dirty="0">
+                <a:solidFill>
+                  <a:srgbClr val="999999"/>
+                </a:solidFill>
+                <a:latin typeface="Consolas" panose="020B0609020204030204" pitchFamily="49" charset="0"/>
+                <a:ea typeface="Menlo"/>
+              </a:rPr>
+              <a:t> </a:t>
+            </a:r>
+            <a:r>
+              <a:rPr lang="en-US" altLang="en-US" sz="3200" dirty="0" smtClean="0">
+                <a:solidFill>
+                  <a:srgbClr val="999999"/>
+                </a:solidFill>
+                <a:latin typeface="Consolas" panose="020B0609020204030204" pitchFamily="49" charset="0"/>
+                <a:ea typeface="Menlo"/>
+              </a:rPr>
+              <a:t> </a:t>
+            </a:r>
+            <a:r>
+              <a:rPr lang="en-US" altLang="en-US" sz="3200" dirty="0" smtClean="0">
+                <a:solidFill>
+                  <a:srgbClr val="333333"/>
+                </a:solidFill>
+                <a:latin typeface="Consolas" panose="020B0609020204030204" pitchFamily="49" charset="0"/>
+                <a:ea typeface="Menlo"/>
+              </a:rPr>
+              <a:t>sum</a:t>
+            </a:r>
+            <a:r>
+              <a:rPr lang="en-US" altLang="en-US" sz="3200" dirty="0" smtClean="0">
+                <a:solidFill>
+                  <a:srgbClr val="999999"/>
+                </a:solidFill>
+                <a:latin typeface="Consolas" panose="020B0609020204030204" pitchFamily="49" charset="0"/>
+                <a:ea typeface="Menlo"/>
+              </a:rPr>
+              <a:t>[</a:t>
+            </a:r>
+            <a:r>
+              <a:rPr lang="en-US" altLang="en-US" sz="3200" dirty="0" smtClean="0">
+                <a:solidFill>
+                  <a:srgbClr val="333333"/>
+                </a:solidFill>
+                <a:latin typeface="Consolas" panose="020B0609020204030204" pitchFamily="49" charset="0"/>
+                <a:ea typeface="Menlo"/>
+              </a:rPr>
+              <a:t>L</a:t>
+            </a:r>
+            <a:r>
+              <a:rPr lang="en-US" altLang="en-US" sz="3200" dirty="0" smtClean="0">
+                <a:solidFill>
+                  <a:srgbClr val="999999"/>
+                </a:solidFill>
+                <a:latin typeface="Consolas" panose="020B0609020204030204" pitchFamily="49" charset="0"/>
+                <a:ea typeface="Menlo"/>
+              </a:rPr>
+              <a:t>][</a:t>
+            </a:r>
+            <a:r>
+              <a:rPr lang="en-US" altLang="en-US" sz="3200" dirty="0" smtClean="0">
+                <a:solidFill>
+                  <a:srgbClr val="333333"/>
+                </a:solidFill>
+                <a:latin typeface="Consolas" panose="020B0609020204030204" pitchFamily="49" charset="0"/>
+                <a:ea typeface="Menlo"/>
+              </a:rPr>
+              <a:t>L</a:t>
+            </a:r>
+            <a:r>
+              <a:rPr lang="en-US" altLang="en-US" sz="3200" dirty="0" smtClean="0">
+                <a:solidFill>
+                  <a:srgbClr val="9A6E3A"/>
+                </a:solidFill>
+                <a:latin typeface="Consolas" panose="020B0609020204030204" pitchFamily="49" charset="0"/>
+                <a:ea typeface="Menlo"/>
+              </a:rPr>
+              <a:t>-</a:t>
+            </a:r>
+            <a:r>
+              <a:rPr lang="en-US" altLang="en-US" sz="3200" dirty="0" smtClean="0">
+                <a:solidFill>
                   <a:srgbClr val="990055"/>
                 </a:solidFill>
                 <a:latin typeface="Consolas" panose="020B0609020204030204" pitchFamily="49" charset="0"/>
@@ -28399,6 +28646,36 @@
               <a:t>1</a:t>
             </a:r>
             <a:r>
+              <a:rPr lang="en-US" altLang="en-US" sz="3200" dirty="0" smtClean="0">
+                <a:solidFill>
+                  <a:srgbClr val="999999"/>
+                </a:solidFill>
+                <a:latin typeface="Consolas" panose="020B0609020204030204" pitchFamily="49" charset="0"/>
+                <a:ea typeface="Menlo"/>
+              </a:rPr>
+              <a:t>] </a:t>
+            </a:r>
+            <a:r>
+              <a:rPr lang="en-US" altLang="en-US" sz="3200" dirty="0" smtClean="0">
+                <a:solidFill>
+                  <a:srgbClr val="9A6E3A"/>
+                </a:solidFill>
+                <a:latin typeface="Consolas" panose="020B0609020204030204" pitchFamily="49" charset="0"/>
+                <a:ea typeface="Menlo"/>
+              </a:rPr>
+              <a:t>= </a:t>
+            </a:r>
+            <a:r>
+              <a:rPr lang="en-US" altLang="en-US" sz="3200" dirty="0" smtClean="0">
+                <a:solidFill>
+                  <a:srgbClr val="990055"/>
+                </a:solidFill>
+                <a:latin typeface="Consolas" panose="020B0609020204030204" pitchFamily="49" charset="0"/>
+                <a:ea typeface="Menlo"/>
+              </a:rPr>
+              <a:t>0</a:t>
+            </a:r>
+            <a:r>
               <a:rPr lang="en-US" altLang="en-US" sz="3200" dirty="0">
                 <a:solidFill>
                   <a:srgbClr val="999999"/>
@@ -28407,76 +28684,6 @@
                 <a:ea typeface="Menlo"/>
               </a:rPr>
               <a:t>;</a:t>
-            </a:r>
-            <a:r>
-              <a:rPr lang="en-US" altLang="en-US" sz="3200" dirty="0">
-                <a:solidFill>
-                  <a:srgbClr val="333333"/>
-                </a:solidFill>
-                <a:latin typeface="Consolas" panose="020B0609020204030204" pitchFamily="49" charset="0"/>
-                <a:ea typeface="Menlo"/>
-              </a:rPr>
-              <a:t> L </a:t>
-            </a:r>
-            <a:r>
-              <a:rPr lang="en-US" altLang="en-US" sz="3200" dirty="0">
-                <a:solidFill>
-                  <a:srgbClr val="9A6E3A"/>
-                </a:solidFill>
-                <a:latin typeface="Consolas" panose="020B0609020204030204" pitchFamily="49" charset="0"/>
-                <a:ea typeface="Menlo"/>
-              </a:rPr>
-              <a:t>&lt;=</a:t>
-            </a:r>
-            <a:r>
-              <a:rPr lang="en-US" altLang="en-US" sz="3200" dirty="0">
-                <a:solidFill>
-                  <a:srgbClr val="333333"/>
-                </a:solidFill>
-                <a:latin typeface="Consolas" panose="020B0609020204030204" pitchFamily="49" charset="0"/>
-                <a:ea typeface="Menlo"/>
-              </a:rPr>
-              <a:t> N</a:t>
-            </a:r>
-            <a:r>
-              <a:rPr lang="en-US" altLang="en-US" sz="3200" dirty="0">
-                <a:solidFill>
-                  <a:srgbClr val="999999"/>
-                </a:solidFill>
-                <a:latin typeface="Consolas" panose="020B0609020204030204" pitchFamily="49" charset="0"/>
-                <a:ea typeface="Menlo"/>
-              </a:rPr>
-              <a:t>;</a:t>
-            </a:r>
-            <a:r>
-              <a:rPr lang="en-US" altLang="en-US" sz="3200" dirty="0">
-                <a:solidFill>
-                  <a:srgbClr val="333333"/>
-                </a:solidFill>
-                <a:latin typeface="Consolas" panose="020B0609020204030204" pitchFamily="49" charset="0"/>
-                <a:ea typeface="Menlo"/>
-              </a:rPr>
-              <a:t> L</a:t>
-            </a:r>
-            <a:r>
-              <a:rPr lang="en-US" altLang="en-US" sz="3200" dirty="0">
-                <a:solidFill>
-                  <a:srgbClr val="9A6E3A"/>
-                </a:solidFill>
-                <a:latin typeface="Consolas" panose="020B0609020204030204" pitchFamily="49" charset="0"/>
-                <a:ea typeface="Menlo"/>
-              </a:rPr>
-              <a:t>++</a:t>
-            </a:r>
-            <a:r>
-              <a:rPr lang="en-US" altLang="en-US" sz="3200" dirty="0">
-                <a:solidFill>
-                  <a:srgbClr val="999999"/>
-                </a:solidFill>
-                <a:latin typeface="Consolas" panose="020B0609020204030204" pitchFamily="49" charset="0"/>
-                <a:ea typeface="Menlo"/>
-              </a:rPr>
-              <a:t>) {</a:t>
             </a:r>
             <a:endParaRPr lang="en-US" altLang="en-US" sz="3200" dirty="0">
               <a:solidFill>
@@ -28631,7 +28838,7 @@
               <a:t> R</a:t>
             </a:r>
             <a:r>
-              <a:rPr lang="en-US" altLang="en-US" sz="3200" dirty="0">
+              <a:rPr lang="en-US" altLang="en-US" sz="3200" dirty="0" smtClean="0">
                 <a:solidFill>
                   <a:srgbClr val="9A6E3A"/>
                 </a:solidFill>
@@ -28641,7 +28848,7 @@
               <a:t>++</a:t>
             </a:r>
             <a:r>
-              <a:rPr lang="en-US" altLang="en-US" sz="3200" dirty="0">
+              <a:rPr lang="en-US" altLang="en-US" sz="3200" dirty="0" smtClean="0">
                 <a:solidFill>
                   <a:srgbClr val="999999"/>
                 </a:solidFill>
@@ -28651,7 +28858,7 @@
               <a:t>)</a:t>
             </a:r>
             <a:r>
-              <a:rPr lang="zh-TW" altLang="en-US" sz="3200" dirty="0">
+              <a:rPr lang="zh-TW" altLang="en-US" sz="3200" dirty="0" smtClean="0">
                 <a:solidFill>
                   <a:srgbClr val="999999"/>
                 </a:solidFill>
@@ -28743,254 +28950,150 @@
                 <a:latin typeface="Consolas" panose="020B0609020204030204" pitchFamily="49" charset="0"/>
                 <a:ea typeface="Menlo"/>
               </a:rPr>
-              <a:t>] = </a:t>
-            </a:r>
-            <a:r>
-              <a:rPr lang="en-US" altLang="zh-TW" sz="3200" dirty="0">
+              <a:t>] </a:t>
+            </a:r>
+            <a:r>
+              <a:rPr lang="en-US" altLang="en-US" sz="3200" dirty="0" smtClean="0">
+                <a:solidFill>
+                  <a:srgbClr val="9A6E3A"/>
+                </a:solidFill>
+                <a:latin typeface="Consolas" panose="020B0609020204030204" pitchFamily="49" charset="0"/>
+                <a:ea typeface="Menlo"/>
+              </a:rPr>
+              <a:t>=</a:t>
+            </a:r>
+            <a:r>
+              <a:rPr lang="en-US" altLang="en-US" sz="3200" dirty="0" smtClean="0">
                 <a:solidFill>
                   <a:srgbClr val="999999"/>
                 </a:solidFill>
                 <a:latin typeface="Consolas" panose="020B0609020204030204" pitchFamily="49" charset="0"/>
                 <a:ea typeface="Menlo"/>
               </a:rPr>
-              <a:t>(</a:t>
-            </a:r>
-            <a:r>
-              <a:rPr lang="en-US" altLang="zh-TW" sz="3200" dirty="0">
+              <a:t> </a:t>
+            </a:r>
+            <a:r>
+              <a:rPr lang="en-US" altLang="en-US" sz="3200" dirty="0" smtClean="0">
+                <a:solidFill>
+                  <a:srgbClr val="333333"/>
+                </a:solidFill>
                 <a:latin typeface="Consolas" panose="020B0609020204030204" pitchFamily="49" charset="0"/>
                 <a:ea typeface="Menlo"/>
               </a:rPr>
+              <a:t>sum</a:t>
+            </a:r>
+            <a:r>
+              <a:rPr lang="en-US" altLang="en-US" sz="3200" dirty="0" smtClean="0">
+                <a:solidFill>
+                  <a:srgbClr val="999999"/>
+                </a:solidFill>
+                <a:latin typeface="Consolas" panose="020B0609020204030204" pitchFamily="49" charset="0"/>
+                <a:ea typeface="Menlo"/>
+              </a:rPr>
+              <a:t>[</a:t>
+            </a:r>
+            <a:r>
+              <a:rPr lang="en-US" altLang="en-US" sz="3200" dirty="0" smtClean="0">
+                <a:solidFill>
+                  <a:srgbClr val="333333"/>
+                </a:solidFill>
+                <a:latin typeface="Consolas" panose="020B0609020204030204" pitchFamily="49" charset="0"/>
+                <a:ea typeface="Menlo"/>
+              </a:rPr>
+              <a:t>L</a:t>
+            </a:r>
+            <a:r>
+              <a:rPr lang="en-US" altLang="en-US" sz="3200" dirty="0">
+                <a:solidFill>
+                  <a:srgbClr val="999999"/>
+                </a:solidFill>
+                <a:latin typeface="Consolas" panose="020B0609020204030204" pitchFamily="49" charset="0"/>
+                <a:ea typeface="Menlo"/>
+              </a:rPr>
+              <a:t>][</a:t>
+            </a:r>
+            <a:r>
+              <a:rPr lang="en-US" altLang="en-US" sz="3200" dirty="0" smtClean="0">
+                <a:solidFill>
+                  <a:srgbClr val="333333"/>
+                </a:solidFill>
+                <a:latin typeface="Consolas" panose="020B0609020204030204" pitchFamily="49" charset="0"/>
+                <a:ea typeface="Menlo"/>
+              </a:rPr>
               <a:t>R</a:t>
             </a:r>
             <a:r>
-              <a:rPr lang="en-US" altLang="zh-TW" sz="3200" dirty="0">
+              <a:rPr lang="en-US" altLang="en-US" sz="3200" dirty="0" smtClean="0">
                 <a:solidFill>
                   <a:srgbClr val="9A6E3A"/>
                 </a:solidFill>
                 <a:latin typeface="Consolas" panose="020B0609020204030204" pitchFamily="49" charset="0"/>
                 <a:ea typeface="Menlo"/>
               </a:rPr>
-              <a:t>&gt;</a:t>
-            </a:r>
-            <a:r>
-              <a:rPr lang="en-US" altLang="zh-TW" sz="3200" dirty="0">
+              <a:t>-</a:t>
+            </a:r>
+            <a:r>
+              <a:rPr lang="en-US" altLang="en-US" sz="3200" dirty="0">
+                <a:solidFill>
+                  <a:srgbClr val="990055"/>
+                </a:solidFill>
                 <a:latin typeface="Consolas" panose="020B0609020204030204" pitchFamily="49" charset="0"/>
                 <a:ea typeface="Menlo"/>
               </a:rPr>
-              <a:t>L</a:t>
-            </a:r>
-            <a:r>
-              <a:rPr lang="en-US" altLang="zh-TW" sz="3200" dirty="0">
+              <a:t>1</a:t>
+            </a:r>
+            <a:r>
+              <a:rPr lang="en-US" altLang="en-US" sz="3200" dirty="0" smtClean="0">
                 <a:solidFill>
                   <a:srgbClr val="999999"/>
                 </a:solidFill>
                 <a:latin typeface="Consolas" panose="020B0609020204030204" pitchFamily="49" charset="0"/>
                 <a:ea typeface="Menlo"/>
               </a:rPr>
-              <a:t>)</a:t>
-            </a:r>
-            <a:r>
-              <a:rPr lang="zh-TW" altLang="en-US" sz="3200" dirty="0">
+              <a:t>] </a:t>
+            </a:r>
+            <a:r>
+              <a:rPr lang="en-US" altLang="en-US" sz="3200" dirty="0" smtClean="0">
+                <a:solidFill>
+                  <a:srgbClr val="9A6E3A"/>
+                </a:solidFill>
+                <a:latin typeface="Consolas" panose="020B0609020204030204" pitchFamily="49" charset="0"/>
+                <a:ea typeface="Menlo"/>
+              </a:rPr>
+              <a:t>+ </a:t>
+            </a:r>
+            <a:r>
+              <a:rPr lang="en-US" altLang="en-US" sz="3200" dirty="0" smtClean="0">
+                <a:solidFill>
+                  <a:srgbClr val="333333"/>
+                </a:solidFill>
+                <a:latin typeface="Consolas" panose="020B0609020204030204" pitchFamily="49" charset="0"/>
+                <a:ea typeface="Menlo"/>
+              </a:rPr>
+              <a:t>A</a:t>
+            </a:r>
+            <a:r>
+              <a:rPr lang="en-US" altLang="en-US" sz="3200" dirty="0" smtClean="0">
                 <a:solidFill>
                   <a:srgbClr val="999999"/>
                 </a:solidFill>
                 <a:latin typeface="Consolas" panose="020B0609020204030204" pitchFamily="49" charset="0"/>
                 <a:ea typeface="Menlo"/>
               </a:rPr>
-              <a:t> </a:t>
-            </a:r>
-            <a:r>
-              <a:rPr lang="en-US" altLang="zh-TW" sz="3200" dirty="0">
-                <a:solidFill>
-                  <a:srgbClr val="999999"/>
+              <a:t>[</a:t>
+            </a:r>
+            <a:r>
+              <a:rPr lang="en-US" altLang="en-US" sz="3200" dirty="0" smtClean="0">
+                <a:solidFill>
+                  <a:srgbClr val="333333"/>
                 </a:solidFill>
                 <a:latin typeface="Consolas" panose="020B0609020204030204" pitchFamily="49" charset="0"/>
                 <a:ea typeface="Menlo"/>
               </a:rPr>
-              <a:t>?</a:t>
-            </a:r>
-            <a:r>
-              <a:rPr lang="zh-TW" altLang="en-US" sz="3200" dirty="0">
-                <a:solidFill>
-                  <a:srgbClr val="999999"/>
-                </a:solidFill>
-                <a:latin typeface="Consolas" panose="020B0609020204030204" pitchFamily="49" charset="0"/>
-                <a:ea typeface="Menlo"/>
-              </a:rPr>
-              <a:t> </a:t>
-            </a:r>
-            <a:r>
-              <a:rPr lang="en-US" altLang="en-US" sz="3200" dirty="0">
-                <a:solidFill>
-                  <a:srgbClr val="333333"/>
-                </a:solidFill>
-                <a:latin typeface="Consolas" panose="020B0609020204030204" pitchFamily="49" charset="0"/>
-                <a:ea typeface="Menlo"/>
-              </a:rPr>
-              <a:t>sum</a:t>
-            </a:r>
-            <a:r>
-              <a:rPr lang="en-US" altLang="en-US" sz="3200" dirty="0">
-                <a:solidFill>
-                  <a:srgbClr val="999999"/>
-                </a:solidFill>
-                <a:latin typeface="Consolas" panose="020B0609020204030204" pitchFamily="49" charset="0"/>
-                <a:ea typeface="Menlo"/>
-              </a:rPr>
-              <a:t>[</a:t>
-            </a:r>
-            <a:r>
-              <a:rPr lang="en-US" altLang="en-US" sz="3200" dirty="0">
-                <a:solidFill>
-                  <a:srgbClr val="333333"/>
-                </a:solidFill>
-                <a:latin typeface="Consolas" panose="020B0609020204030204" pitchFamily="49" charset="0"/>
-                <a:ea typeface="Menlo"/>
-              </a:rPr>
-              <a:t>L</a:t>
-            </a:r>
-            <a:r>
-              <a:rPr lang="en-US" altLang="en-US" sz="3200" dirty="0">
-                <a:solidFill>
-                  <a:srgbClr val="999999"/>
-                </a:solidFill>
-                <a:latin typeface="Consolas" panose="020B0609020204030204" pitchFamily="49" charset="0"/>
-                <a:ea typeface="Menlo"/>
-              </a:rPr>
-              <a:t>][</a:t>
-            </a:r>
-            <a:r>
-              <a:rPr lang="en-US" altLang="en-US" sz="3200" dirty="0">
-                <a:solidFill>
-                  <a:srgbClr val="333333"/>
-                </a:solidFill>
-                <a:latin typeface="Consolas" panose="020B0609020204030204" pitchFamily="49" charset="0"/>
-                <a:ea typeface="Menlo"/>
-              </a:rPr>
-              <a:t>R-1</a:t>
-            </a:r>
-            <a:r>
-              <a:rPr lang="en-US" altLang="en-US" sz="3200" dirty="0">
-                <a:solidFill>
-                  <a:srgbClr val="999999"/>
-                </a:solidFill>
-                <a:latin typeface="Consolas" panose="020B0609020204030204" pitchFamily="49" charset="0"/>
-                <a:ea typeface="Menlo"/>
-              </a:rPr>
-              <a:t>]</a:t>
-            </a:r>
-            <a:r>
-              <a:rPr lang="en-US" altLang="en-US" sz="3200" dirty="0">
-                <a:solidFill>
-                  <a:srgbClr val="9A6E3A"/>
-                </a:solidFill>
-                <a:latin typeface="Consolas" panose="020B0609020204030204" pitchFamily="49" charset="0"/>
-                <a:ea typeface="Menlo"/>
-              </a:rPr>
-              <a:t>+</a:t>
-            </a:r>
-            <a:r>
-              <a:rPr lang="en-US" altLang="en-US" sz="3200" dirty="0">
-                <a:solidFill>
-                  <a:srgbClr val="333333"/>
-                </a:solidFill>
-                <a:latin typeface="Consolas" panose="020B0609020204030204" pitchFamily="49" charset="0"/>
-                <a:ea typeface="Menlo"/>
-              </a:rPr>
-              <a:t>A</a:t>
-            </a:r>
-            <a:r>
-              <a:rPr lang="en-US" altLang="en-US" sz="3200" dirty="0">
-                <a:solidFill>
-                  <a:srgbClr val="999999"/>
-                </a:solidFill>
-                <a:latin typeface="Consolas" panose="020B0609020204030204" pitchFamily="49" charset="0"/>
-                <a:ea typeface="Menlo"/>
-              </a:rPr>
-              <a:t>[</a:t>
-            </a:r>
-            <a:r>
-              <a:rPr lang="en-US" altLang="en-US" sz="3200" dirty="0">
-                <a:solidFill>
-                  <a:srgbClr val="333333"/>
-                </a:solidFill>
-                <a:latin typeface="Consolas" panose="020B0609020204030204" pitchFamily="49" charset="0"/>
-                <a:ea typeface="Menlo"/>
-              </a:rPr>
               <a:t>R</a:t>
             </a:r>
             <a:r>
-              <a:rPr lang="en-US" altLang="en-US" sz="3200" dirty="0">
-                <a:solidFill>
-                  <a:srgbClr val="999999"/>
-                </a:solidFill>
-                <a:latin typeface="Consolas" panose="020B0609020204030204" pitchFamily="49" charset="0"/>
-                <a:ea typeface="Menlo"/>
-              </a:rPr>
-              <a:t>]</a:t>
-            </a:r>
-            <a:r>
-              <a:rPr lang="zh-TW" altLang="en-US" sz="3200" dirty="0">
-                <a:solidFill>
-                  <a:srgbClr val="999999"/>
-                </a:solidFill>
-                <a:latin typeface="Consolas" panose="020B0609020204030204" pitchFamily="49" charset="0"/>
-                <a:ea typeface="Menlo"/>
-              </a:rPr>
-              <a:t> </a:t>
-            </a:r>
-            <a:r>
-              <a:rPr lang="en-US" altLang="zh-TW" sz="3200" dirty="0">
-                <a:solidFill>
-                  <a:srgbClr val="999999"/>
-                </a:solidFill>
-                <a:latin typeface="Consolas" panose="020B0609020204030204" pitchFamily="49" charset="0"/>
-                <a:ea typeface="Menlo"/>
-              </a:rPr>
-              <a:t>:</a:t>
-            </a:r>
-            <a:r>
-              <a:rPr lang="zh-TW" altLang="en-US" sz="3200" dirty="0">
-                <a:solidFill>
-                  <a:srgbClr val="999999"/>
-                </a:solidFill>
-                <a:latin typeface="Consolas" panose="020B0609020204030204" pitchFamily="49" charset="0"/>
-                <a:ea typeface="Menlo"/>
-              </a:rPr>
-              <a:t> </a:t>
-            </a:r>
-            <a:r>
-              <a:rPr lang="en-US" altLang="en-US" sz="3200" dirty="0">
-                <a:solidFill>
-                  <a:srgbClr val="333333"/>
-                </a:solidFill>
-                <a:latin typeface="Consolas" panose="020B0609020204030204" pitchFamily="49" charset="0"/>
-                <a:ea typeface="Menlo"/>
-              </a:rPr>
-              <a:t>A</a:t>
-            </a:r>
-            <a:r>
-              <a:rPr lang="en-US" altLang="en-US" sz="3200" dirty="0">
-                <a:solidFill>
-                  <a:srgbClr val="999999"/>
-                </a:solidFill>
-                <a:latin typeface="Consolas" panose="020B0609020204030204" pitchFamily="49" charset="0"/>
-                <a:ea typeface="Menlo"/>
-              </a:rPr>
-              <a:t>[</a:t>
-            </a:r>
-            <a:r>
-              <a:rPr lang="en-US" altLang="en-US" sz="3200" dirty="0">
-                <a:solidFill>
-                  <a:srgbClr val="333333"/>
-                </a:solidFill>
-                <a:latin typeface="Consolas" panose="020B0609020204030204" pitchFamily="49" charset="0"/>
-                <a:ea typeface="Menlo"/>
-              </a:rPr>
-              <a:t>R</a:t>
-            </a:r>
-            <a:r>
-              <a:rPr lang="en-US" altLang="en-US" sz="3200" dirty="0">
+              <a:rPr lang="en-US" altLang="en-US" sz="3200" dirty="0" smtClean="0">
                 <a:solidFill>
                   <a:srgbClr val="999999"/>
                 </a:solidFill>
@@ -29318,104 +29421,114 @@
               <a:buNone/>
             </a:pPr>
             <a:r>
+              <a:rPr lang="en-US" altLang="en-US" dirty="0" smtClean="0">
+                <a:solidFill>
+                  <a:srgbClr val="333333"/>
+                </a:solidFill>
+                <a:latin typeface="Consolas" panose="020B0609020204030204" pitchFamily="49" charset="0"/>
+                <a:ea typeface="Menlo"/>
+              </a:rPr>
+              <a:t>sum</a:t>
+            </a:r>
+            <a:r>
+              <a:rPr lang="en-US" altLang="en-US" dirty="0" smtClean="0">
+                <a:solidFill>
+                  <a:srgbClr val="999999"/>
+                </a:solidFill>
+                <a:latin typeface="Consolas" panose="020B0609020204030204" pitchFamily="49" charset="0"/>
+                <a:ea typeface="Menlo"/>
+              </a:rPr>
+              <a:t>[</a:t>
+            </a:r>
+            <a:r>
+              <a:rPr lang="en-US" altLang="en-US" dirty="0" smtClean="0">
+                <a:solidFill>
+                  <a:srgbClr val="333333"/>
+                </a:solidFill>
+                <a:latin typeface="Consolas" panose="020B0609020204030204" pitchFamily="49" charset="0"/>
+                <a:ea typeface="Menlo"/>
+              </a:rPr>
+              <a:t>L</a:t>
+            </a:r>
+            <a:r>
               <a:rPr lang="en-US" altLang="en-US" dirty="0">
                 <a:solidFill>
+                  <a:srgbClr val="999999"/>
+                </a:solidFill>
+                <a:latin typeface="Consolas" panose="020B0609020204030204" pitchFamily="49" charset="0"/>
+                <a:ea typeface="Menlo"/>
+              </a:rPr>
+              <a:t>][</a:t>
+            </a:r>
+            <a:r>
+              <a:rPr lang="en-US" altLang="en-US" dirty="0">
+                <a:solidFill>
                   <a:srgbClr val="333333"/>
                 </a:solidFill>
                 <a:latin typeface="Consolas" panose="020B0609020204030204" pitchFamily="49" charset="0"/>
                 <a:ea typeface="Menlo"/>
               </a:rPr>
-              <a:t>sum</a:t>
+              <a:t>L</a:t>
             </a:r>
             <a:r>
               <a:rPr lang="en-US" altLang="en-US" dirty="0">
                 <a:solidFill>
+                  <a:srgbClr val="9A6E3A"/>
+                </a:solidFill>
+                <a:latin typeface="Consolas" panose="020B0609020204030204" pitchFamily="49" charset="0"/>
+                <a:ea typeface="Menlo"/>
+              </a:rPr>
+              <a:t>-</a:t>
+            </a:r>
+            <a:r>
+              <a:rPr lang="en-US" altLang="en-US" dirty="0">
+                <a:solidFill>
+                  <a:srgbClr val="990055"/>
+                </a:solidFill>
+                <a:latin typeface="Consolas" panose="020B0609020204030204" pitchFamily="49" charset="0"/>
+                <a:ea typeface="Menlo"/>
+              </a:rPr>
+              <a:t>1</a:t>
+            </a:r>
+            <a:r>
+              <a:rPr lang="en-US" altLang="en-US" dirty="0">
+                <a:solidFill>
                   <a:srgbClr val="999999"/>
                 </a:solidFill>
                 <a:latin typeface="Consolas" panose="020B0609020204030204" pitchFamily="49" charset="0"/>
                 <a:ea typeface="Menlo"/>
               </a:rPr>
-              <a:t>[</a:t>
+              <a:t>] </a:t>
             </a:r>
             <a:r>
               <a:rPr lang="en-US" altLang="en-US" dirty="0">
                 <a:solidFill>
-                  <a:srgbClr val="333333"/>
+                  <a:srgbClr val="9A6E3A"/>
                 </a:solidFill>
                 <a:latin typeface="Consolas" panose="020B0609020204030204" pitchFamily="49" charset="0"/>
                 <a:ea typeface="Menlo"/>
               </a:rPr>
-              <a:t>L</a:t>
+              <a:t>= </a:t>
             </a:r>
             <a:r>
               <a:rPr lang="en-US" altLang="en-US" dirty="0">
                 <a:solidFill>
+                  <a:srgbClr val="990055"/>
+                </a:solidFill>
+                <a:latin typeface="Consolas" panose="020B0609020204030204" pitchFamily="49" charset="0"/>
+                <a:ea typeface="Menlo"/>
+              </a:rPr>
+              <a:t>0</a:t>
+            </a:r>
+            <a:r>
+              <a:rPr lang="en-US" altLang="en-US" dirty="0">
+                <a:solidFill>
                   <a:srgbClr val="999999"/>
                 </a:solidFill>
                 <a:latin typeface="Consolas" panose="020B0609020204030204" pitchFamily="49" charset="0"/>
                 <a:ea typeface="Menlo"/>
               </a:rPr>
-              <a:t>][</a:t>
-            </a:r>
-            <a:r>
-              <a:rPr lang="en-US" altLang="en-US" dirty="0">
-                <a:solidFill>
-                  <a:srgbClr val="333333"/>
-                </a:solidFill>
-                <a:latin typeface="Consolas" panose="020B0609020204030204" pitchFamily="49" charset="0"/>
-                <a:ea typeface="Menlo"/>
-              </a:rPr>
-              <a:t>L</a:t>
-            </a:r>
-            <a:r>
-              <a:rPr lang="en-US" altLang="en-US" dirty="0">
-                <a:solidFill>
-                  <a:srgbClr val="999999"/>
-                </a:solidFill>
-                <a:latin typeface="Consolas" panose="020B0609020204030204" pitchFamily="49" charset="0"/>
-                <a:ea typeface="Menlo"/>
-              </a:rPr>
-              <a:t>] = </a:t>
-            </a:r>
-            <a:r>
-              <a:rPr lang="en-US" altLang="en-US" dirty="0">
-                <a:solidFill>
-                  <a:srgbClr val="333333"/>
-                </a:solidFill>
-                <a:latin typeface="Consolas" panose="020B0609020204030204" pitchFamily="49" charset="0"/>
-                <a:ea typeface="Menlo"/>
-              </a:rPr>
-              <a:t>A</a:t>
-            </a:r>
-            <a:r>
-              <a:rPr lang="en-US" altLang="en-US" dirty="0">
-                <a:solidFill>
-                  <a:srgbClr val="999999"/>
-                </a:solidFill>
-                <a:latin typeface="Consolas" panose="020B0609020204030204" pitchFamily="49" charset="0"/>
-                <a:ea typeface="Menlo"/>
-              </a:rPr>
-              <a:t>[</a:t>
-            </a:r>
-            <a:r>
-              <a:rPr lang="en-US" altLang="en-US" dirty="0">
-                <a:solidFill>
-                  <a:srgbClr val="333333"/>
-                </a:solidFill>
-                <a:latin typeface="Consolas" panose="020B0609020204030204" pitchFamily="49" charset="0"/>
-                <a:ea typeface="Menlo"/>
-              </a:rPr>
-              <a:t>L</a:t>
-            </a:r>
-            <a:r>
-              <a:rPr lang="en-US" altLang="en-US" dirty="0">
-                <a:solidFill>
-                  <a:srgbClr val="999999"/>
-                </a:solidFill>
-                <a:latin typeface="Consolas" panose="020B0609020204030204" pitchFamily="49" charset="0"/>
-                <a:ea typeface="Menlo"/>
-              </a:rPr>
-              <a:t>];</a:t>
+              <a:t>;</a:t>
             </a:r>
             <a:endParaRPr lang="en-US" altLang="en-US" dirty="0">
               <a:solidFill>
@@ -29430,14 +29543,44 @@
               <a:buNone/>
             </a:pPr>
             <a:r>
+              <a:rPr lang="en-US" altLang="en-US" dirty="0" smtClean="0">
+                <a:solidFill>
+                  <a:srgbClr val="0077AA"/>
+                </a:solidFill>
+                <a:latin typeface="Consolas" panose="020B0609020204030204" pitchFamily="49" charset="0"/>
+                <a:ea typeface="Menlo"/>
+              </a:rPr>
+              <a:t>for</a:t>
+            </a:r>
+            <a:r>
+              <a:rPr lang="en-US" altLang="en-US" dirty="0" smtClean="0">
+                <a:solidFill>
+                  <a:srgbClr val="333333"/>
+                </a:solidFill>
+                <a:latin typeface="Consolas" panose="020B0609020204030204" pitchFamily="49" charset="0"/>
+                <a:ea typeface="Menlo"/>
+              </a:rPr>
+              <a:t> </a:t>
+            </a:r>
+            <a:r>
               <a:rPr lang="en-US" altLang="en-US" dirty="0">
                 <a:solidFill>
+                  <a:srgbClr val="999999"/>
+                </a:solidFill>
+                <a:latin typeface="Consolas" panose="020B0609020204030204" pitchFamily="49" charset="0"/>
+                <a:ea typeface="Menlo"/>
+              </a:rPr>
+              <a:t>(</a:t>
+            </a:r>
+            <a:r>
+              <a:rPr lang="en-US" altLang="en-US" dirty="0" err="1">
+                <a:solidFill>
                   <a:srgbClr val="0077AA"/>
                 </a:solidFill>
                 <a:latin typeface="Consolas" panose="020B0609020204030204" pitchFamily="49" charset="0"/>
                 <a:ea typeface="Menlo"/>
               </a:rPr>
-              <a:t>for</a:t>
+              <a:t>int</a:t>
             </a:r>
             <a:r>
               <a:rPr lang="en-US" altLang="en-US" dirty="0">
@@ -29447,130 +29590,100 @@
                 <a:latin typeface="Consolas" panose="020B0609020204030204" pitchFamily="49" charset="0"/>
                 <a:ea typeface="Menlo"/>
               </a:rPr>
-              <a:t> </a:t>
+              <a:t> R </a:t>
             </a:r>
             <a:r>
               <a:rPr lang="en-US" altLang="en-US" dirty="0">
                 <a:solidFill>
+                  <a:srgbClr val="9A6E3A"/>
+                </a:solidFill>
+                <a:latin typeface="Consolas" panose="020B0609020204030204" pitchFamily="49" charset="0"/>
+                <a:ea typeface="Menlo"/>
+              </a:rPr>
+              <a:t>=</a:t>
+            </a:r>
+            <a:r>
+              <a:rPr lang="en-US" altLang="en-US" dirty="0">
+                <a:solidFill>
+                  <a:srgbClr val="333333"/>
+                </a:solidFill>
+                <a:latin typeface="Consolas" panose="020B0609020204030204" pitchFamily="49" charset="0"/>
+                <a:ea typeface="Menlo"/>
+              </a:rPr>
+              <a:t> L</a:t>
+            </a:r>
+            <a:r>
+              <a:rPr lang="en-US" altLang="en-US" dirty="0">
+                <a:solidFill>
                   <a:srgbClr val="999999"/>
                 </a:solidFill>
                 <a:latin typeface="Consolas" panose="020B0609020204030204" pitchFamily="49" charset="0"/>
                 <a:ea typeface="Menlo"/>
               </a:rPr>
-              <a:t>(</a:t>
+              <a:t>;</a:t>
             </a:r>
             <a:r>
               <a:rPr lang="en-US" altLang="en-US" dirty="0">
                 <a:solidFill>
-                  <a:srgbClr val="0077AA"/>
+                  <a:srgbClr val="333333"/>
                 </a:solidFill>
                 <a:latin typeface="Consolas" panose="020B0609020204030204" pitchFamily="49" charset="0"/>
                 <a:ea typeface="Menlo"/>
               </a:rPr>
-              <a:t>int</a:t>
+              <a:t> R </a:t>
             </a:r>
             <a:r>
               <a:rPr lang="en-US" altLang="en-US" dirty="0">
                 <a:solidFill>
+                  <a:srgbClr val="9A6E3A"/>
+                </a:solidFill>
+                <a:latin typeface="Consolas" panose="020B0609020204030204" pitchFamily="49" charset="0"/>
+                <a:ea typeface="Menlo"/>
+              </a:rPr>
+              <a:t>&lt;=</a:t>
+            </a:r>
+            <a:r>
+              <a:rPr lang="en-US" altLang="en-US" dirty="0">
+                <a:solidFill>
                   <a:srgbClr val="333333"/>
                 </a:solidFill>
                 <a:latin typeface="Consolas" panose="020B0609020204030204" pitchFamily="49" charset="0"/>
                 <a:ea typeface="Menlo"/>
               </a:rPr>
-              <a:t> R </a:t>
+              <a:t> N</a:t>
             </a:r>
             <a:r>
               <a:rPr lang="en-US" altLang="en-US" dirty="0">
                 <a:solidFill>
+                  <a:srgbClr val="999999"/>
+                </a:solidFill>
+                <a:latin typeface="Consolas" panose="020B0609020204030204" pitchFamily="49" charset="0"/>
+                <a:ea typeface="Menlo"/>
+              </a:rPr>
+              <a:t>;</a:t>
+            </a:r>
+            <a:r>
+              <a:rPr lang="en-US" altLang="en-US" dirty="0">
+                <a:solidFill>
+                  <a:srgbClr val="333333"/>
+                </a:solidFill>
+                <a:latin typeface="Consolas" panose="020B0609020204030204" pitchFamily="49" charset="0"/>
+                <a:ea typeface="Menlo"/>
+              </a:rPr>
+              <a:t> R</a:t>
+            </a:r>
+            <a:r>
+              <a:rPr lang="en-US" altLang="en-US" dirty="0" smtClean="0">
+                <a:solidFill>
                   <a:srgbClr val="9A6E3A"/>
                 </a:solidFill>
                 <a:latin typeface="Consolas" panose="020B0609020204030204" pitchFamily="49" charset="0"/>
                 <a:ea typeface="Menlo"/>
               </a:rPr>
-              <a:t>=</a:t>
-            </a:r>
-            <a:r>
-              <a:rPr lang="en-US" altLang="en-US" dirty="0">
-                <a:solidFill>
-                  <a:srgbClr val="333333"/>
-                </a:solidFill>
-                <a:latin typeface="Consolas" panose="020B0609020204030204" pitchFamily="49" charset="0"/>
-                <a:ea typeface="Menlo"/>
-              </a:rPr>
-              <a:t> L</a:t>
-            </a:r>
-            <a:r>
-              <a:rPr lang="en-US" altLang="en-US" dirty="0">
-                <a:solidFill>
-                  <a:srgbClr val="999999"/>
-                </a:solidFill>
-                <a:latin typeface="Consolas" panose="020B0609020204030204" pitchFamily="49" charset="0"/>
-                <a:ea typeface="Menlo"/>
-              </a:rPr>
-              <a:t>;</a:t>
-            </a:r>
-            <a:r>
-              <a:rPr lang="en-US" altLang="en-US" dirty="0">
-                <a:solidFill>
-                  <a:srgbClr val="333333"/>
-                </a:solidFill>
-                <a:latin typeface="Consolas" panose="020B0609020204030204" pitchFamily="49" charset="0"/>
-                <a:ea typeface="Menlo"/>
-              </a:rPr>
-              <a:t> R </a:t>
-            </a:r>
-            <a:r>
-              <a:rPr lang="en-US" altLang="en-US" dirty="0">
-                <a:solidFill>
-                  <a:srgbClr val="9A6E3A"/>
-                </a:solidFill>
-                <a:latin typeface="Consolas" panose="020B0609020204030204" pitchFamily="49" charset="0"/>
-                <a:ea typeface="Menlo"/>
-              </a:rPr>
-              <a:t>&lt;=</a:t>
-            </a:r>
-            <a:r>
-              <a:rPr lang="en-US" altLang="en-US" dirty="0">
-                <a:solidFill>
-                  <a:srgbClr val="333333"/>
-                </a:solidFill>
-                <a:latin typeface="Consolas" panose="020B0609020204030204" pitchFamily="49" charset="0"/>
-                <a:ea typeface="Menlo"/>
-              </a:rPr>
-              <a:t> N</a:t>
-            </a:r>
-            <a:r>
-              <a:rPr lang="en-US" altLang="en-US" dirty="0">
-                <a:solidFill>
-                  <a:srgbClr val="999999"/>
-                </a:solidFill>
-                <a:latin typeface="Consolas" panose="020B0609020204030204" pitchFamily="49" charset="0"/>
-                <a:ea typeface="Menlo"/>
-              </a:rPr>
-              <a:t>;</a:t>
-            </a:r>
-            <a:r>
-              <a:rPr lang="en-US" altLang="en-US" dirty="0">
-                <a:solidFill>
-                  <a:srgbClr val="333333"/>
-                </a:solidFill>
-                <a:latin typeface="Consolas" panose="020B0609020204030204" pitchFamily="49" charset="0"/>
-                <a:ea typeface="Menlo"/>
-              </a:rPr>
-              <a:t> R</a:t>
-            </a:r>
-            <a:r>
-              <a:rPr lang="en-US" altLang="en-US" dirty="0">
-                <a:solidFill>
-                  <a:srgbClr val="9A6E3A"/>
-                </a:solidFill>
-                <a:latin typeface="Consolas" panose="020B0609020204030204" pitchFamily="49" charset="0"/>
-                <a:ea typeface="Menlo"/>
-              </a:rPr>
               <a:t>++</a:t>
             </a:r>
             <a:r>
-              <a:rPr lang="en-US" altLang="en-US" dirty="0">
+              <a:rPr lang="en-US" altLang="en-US" dirty="0" smtClean="0">
                 <a:solidFill>
                   <a:srgbClr val="999999"/>
                 </a:solidFill>
@@ -29592,6 +29705,46 @@
               <a:buNone/>
             </a:pPr>
             <a:r>
+              <a:rPr lang="zh-TW" altLang="en-US" dirty="0">
+                <a:solidFill>
+                  <a:srgbClr val="999999"/>
+                </a:solidFill>
+                <a:latin typeface="Consolas" panose="020B0609020204030204" pitchFamily="49" charset="0"/>
+                <a:ea typeface="Menlo"/>
+              </a:rPr>
+              <a:t>  </a:t>
+            </a:r>
+            <a:r>
+              <a:rPr lang="en-US" altLang="en-US" dirty="0" smtClean="0">
+                <a:solidFill>
+                  <a:srgbClr val="333333"/>
+                </a:solidFill>
+                <a:latin typeface="Consolas" panose="020B0609020204030204" pitchFamily="49" charset="0"/>
+                <a:ea typeface="Menlo"/>
+              </a:rPr>
+              <a:t>sum</a:t>
+            </a:r>
+            <a:r>
+              <a:rPr lang="en-US" altLang="en-US" dirty="0" smtClean="0">
+                <a:solidFill>
+                  <a:srgbClr val="999999"/>
+                </a:solidFill>
+                <a:latin typeface="Consolas" panose="020B0609020204030204" pitchFamily="49" charset="0"/>
+                <a:ea typeface="Menlo"/>
+              </a:rPr>
+              <a:t>[</a:t>
+            </a:r>
+            <a:r>
+              <a:rPr lang="en-US" altLang="en-US" dirty="0" smtClean="0">
+                <a:solidFill>
+                  <a:srgbClr val="333333"/>
+                </a:solidFill>
+                <a:latin typeface="Consolas" panose="020B0609020204030204" pitchFamily="49" charset="0"/>
+                <a:ea typeface="Menlo"/>
+              </a:rPr>
+              <a:t>L</a:t>
+            </a:r>
+            <a:r>
               <a:rPr lang="en-US" altLang="en-US" dirty="0">
                 <a:solidFill>
                   <a:srgbClr val="999999"/>
@@ -29599,7 +29752,7 @@
                 <a:latin typeface="Consolas" panose="020B0609020204030204" pitchFamily="49" charset="0"/>
                 <a:ea typeface="Menlo"/>
               </a:rPr>
-              <a:t>    </a:t>
+              <a:t>][</a:t>
             </a:r>
             <a:r>
               <a:rPr lang="en-US" altLang="en-US" dirty="0">
@@ -29609,6 +29762,46 @@
                 <a:latin typeface="Consolas" panose="020B0609020204030204" pitchFamily="49" charset="0"/>
                 <a:ea typeface="Menlo"/>
               </a:rPr>
+              <a:t>R</a:t>
+            </a:r>
+            <a:r>
+              <a:rPr lang="en-US" altLang="en-US" dirty="0">
+                <a:solidFill>
+                  <a:srgbClr val="999999"/>
+                </a:solidFill>
+                <a:latin typeface="Consolas" panose="020B0609020204030204" pitchFamily="49" charset="0"/>
+                <a:ea typeface="Menlo"/>
+              </a:rPr>
+              <a:t>] </a:t>
+            </a:r>
+            <a:r>
+              <a:rPr lang="en-US" altLang="en-US" dirty="0">
+                <a:solidFill>
+                  <a:srgbClr val="9A6E3A"/>
+                </a:solidFill>
+                <a:latin typeface="Consolas" panose="020B0609020204030204" pitchFamily="49" charset="0"/>
+                <a:ea typeface="Menlo"/>
+              </a:rPr>
+              <a:t>=</a:t>
+            </a:r>
+            <a:r>
+              <a:rPr lang="en-US" altLang="en-US" dirty="0">
+                <a:solidFill>
+                  <a:srgbClr val="999999"/>
+                </a:solidFill>
+                <a:latin typeface="Consolas" panose="020B0609020204030204" pitchFamily="49" charset="0"/>
+                <a:ea typeface="Menlo"/>
+              </a:rPr>
+              <a:t> </a:t>
+            </a:r>
+            <a:r>
+              <a:rPr lang="en-US" altLang="en-US" dirty="0">
+                <a:solidFill>
+                  <a:srgbClr val="333333"/>
+                </a:solidFill>
+                <a:latin typeface="Consolas" panose="020B0609020204030204" pitchFamily="49" charset="0"/>
+                <a:ea typeface="Menlo"/>
+              </a:rPr>
               <a:t>sum</a:t>
             </a:r>
             <a:r>
@@ -29654,22 +29847,52 @@
             <a:r>
               <a:rPr lang="en-US" altLang="en-US" dirty="0">
                 <a:solidFill>
+                  <a:srgbClr val="9A6E3A"/>
+                </a:solidFill>
+                <a:latin typeface="Consolas" panose="020B0609020204030204" pitchFamily="49" charset="0"/>
+                <a:ea typeface="Menlo"/>
+              </a:rPr>
+              <a:t>-</a:t>
+            </a:r>
+            <a:r>
+              <a:rPr lang="en-US" altLang="en-US" dirty="0">
+                <a:solidFill>
+                  <a:srgbClr val="990055"/>
+                </a:solidFill>
+                <a:latin typeface="Consolas" panose="020B0609020204030204" pitchFamily="49" charset="0"/>
+                <a:ea typeface="Menlo"/>
+              </a:rPr>
+              <a:t>1</a:t>
+            </a:r>
+            <a:r>
+              <a:rPr lang="en-US" altLang="en-US" dirty="0">
+                <a:solidFill>
                   <a:srgbClr val="999999"/>
                 </a:solidFill>
                 <a:latin typeface="Consolas" panose="020B0609020204030204" pitchFamily="49" charset="0"/>
                 <a:ea typeface="Menlo"/>
               </a:rPr>
-              <a:t>] = </a:t>
+              <a:t>] </a:t>
             </a:r>
             <a:r>
               <a:rPr lang="en-US" altLang="en-US" dirty="0">
                 <a:solidFill>
+                  <a:srgbClr val="9A6E3A"/>
+                </a:solidFill>
+                <a:latin typeface="Consolas" panose="020B0609020204030204" pitchFamily="49" charset="0"/>
+                <a:ea typeface="Menlo"/>
+              </a:rPr>
+              <a:t>+ </a:t>
+            </a:r>
+            <a:r>
+              <a:rPr lang="en-US" altLang="en-US" dirty="0">
+                <a:solidFill>
                   <a:srgbClr val="333333"/>
                 </a:solidFill>
                 <a:latin typeface="Consolas" panose="020B0609020204030204" pitchFamily="49" charset="0"/>
                 <a:ea typeface="Menlo"/>
               </a:rPr>
-              <a:t>sum</a:t>
+              <a:t>A</a:t>
             </a:r>
             <a:r>
               <a:rPr lang="en-US" altLang="en-US" dirty="0">
@@ -29689,91 +29912,26 @@
                 <a:latin typeface="Consolas" panose="020B0609020204030204" pitchFamily="49" charset="0"/>
                 <a:ea typeface="Menlo"/>
               </a:rPr>
-              <a:t>L</a:t>
-            </a:r>
-            <a:r>
-              <a:rPr lang="en-US" altLang="en-US" dirty="0">
+              <a:t>R</a:t>
+            </a:r>
+            <a:r>
+              <a:rPr lang="en-US" altLang="en-US" dirty="0" smtClean="0">
                 <a:solidFill>
                   <a:srgbClr val="999999"/>
                 </a:solidFill>
                 <a:latin typeface="Consolas" panose="020B0609020204030204" pitchFamily="49" charset="0"/>
                 <a:ea typeface="Menlo"/>
               </a:rPr>
-              <a:t>][</a:t>
-            </a:r>
-            <a:r>
-              <a:rPr lang="en-US" altLang="en-US" dirty="0">
-                <a:solidFill>
-                  <a:srgbClr val="333333"/>
-                </a:solidFill>
-                <a:latin typeface="Consolas" panose="020B0609020204030204" pitchFamily="49" charset="0"/>
-                <a:ea typeface="Menlo"/>
-              </a:rPr>
-              <a:t>R-1</a:t>
-            </a:r>
-            <a:r>
-              <a:rPr lang="en-US" altLang="en-US" dirty="0">
-                <a:solidFill>
-                  <a:srgbClr val="999999"/>
-                </a:solidFill>
-                <a:latin typeface="Consolas" panose="020B0609020204030204" pitchFamily="49" charset="0"/>
-                <a:ea typeface="Menlo"/>
-              </a:rPr>
-              <a:t>] </a:t>
-            </a:r>
-            <a:r>
-              <a:rPr lang="en-US" altLang="en-US" dirty="0">
-                <a:solidFill>
-                  <a:srgbClr val="9A6E3A"/>
-                </a:solidFill>
-                <a:latin typeface="Consolas" panose="020B0609020204030204" pitchFamily="49" charset="0"/>
-                <a:ea typeface="Menlo"/>
-              </a:rPr>
-              <a:t>+ </a:t>
-            </a:r>
-            <a:r>
-              <a:rPr lang="en-US" altLang="en-US" dirty="0">
-                <a:solidFill>
-                  <a:srgbClr val="333333"/>
-                </a:solidFill>
-                <a:latin typeface="Consolas" panose="020B0609020204030204" pitchFamily="49" charset="0"/>
-                <a:ea typeface="Menlo"/>
-              </a:rPr>
-              <a:t>A</a:t>
-            </a:r>
-            <a:r>
-              <a:rPr lang="en-US" altLang="en-US" dirty="0">
-                <a:solidFill>
-                  <a:srgbClr val="999999"/>
-                </a:solidFill>
-                <a:latin typeface="Consolas" panose="020B0609020204030204" pitchFamily="49" charset="0"/>
-                <a:ea typeface="Menlo"/>
-              </a:rPr>
-              <a:t>[</a:t>
-            </a:r>
-            <a:r>
-              <a:rPr lang="en-US" altLang="en-US" dirty="0">
-                <a:solidFill>
-                  <a:srgbClr val="333333"/>
-                </a:solidFill>
-                <a:latin typeface="Consolas" panose="020B0609020204030204" pitchFamily="49" charset="0"/>
-                <a:ea typeface="Menlo"/>
-              </a:rPr>
-              <a:t>R</a:t>
-            </a:r>
-            <a:r>
-              <a:rPr lang="en-US" altLang="en-US" dirty="0">
-                <a:solidFill>
-                  <a:srgbClr val="999999"/>
-                </a:solidFill>
-                <a:latin typeface="Consolas" panose="020B0609020204030204" pitchFamily="49" charset="0"/>
-                <a:ea typeface="Menlo"/>
-              </a:rPr>
               <a:t>];</a:t>
             </a:r>
-            <a:endParaRPr lang="en-US" altLang="en-US" dirty="0">
+          </a:p>
+          <a:p>
+            <a:pPr marL="0" indent="0">
+              <a:buNone/>
+            </a:pPr>
+            <a:endParaRPr lang="en-US" altLang="en-US" dirty="0" smtClean="0">
               <a:solidFill>
-                <a:srgbClr val="333333"/>
+                <a:srgbClr val="999999"/>
               </a:solidFill>
               <a:latin typeface="Consolas" panose="020B0609020204030204" pitchFamily="49" charset="0"/>
               <a:ea typeface="Menlo"/>
@@ -29783,16 +29941,56 @@
             <a:pPr marL="0" indent="0">
               <a:buNone/>
             </a:pPr>
-            <a:endParaRPr lang="en-US" altLang="zh-TW" dirty="0"/>
+            <a:r>
+              <a:rPr lang="zh-TW" altLang="en-US" dirty="0" smtClean="0"/>
+              <a:t>從</a:t>
+            </a:r>
+            <a:r>
+              <a:rPr lang="zh-TW" altLang="en-US" dirty="0"/>
+              <a:t>邊界遞推地紀錄所有問題的解，且一個項用到前一項的最佳</a:t>
+            </a:r>
+            <a:r>
+              <a:rPr lang="zh-TW" altLang="en-US" dirty="0" smtClean="0"/>
+              <a:t>結果</a:t>
+            </a:r>
+            <a:endParaRPr lang="en-US" altLang="zh-TW" dirty="0" smtClean="0"/>
           </a:p>
           <a:p>
             <a:pPr marL="0" indent="0">
               <a:buNone/>
             </a:pPr>
             <a:r>
-              <a:rPr lang="zh-TW" altLang="en-US" dirty="0"/>
-              <a:t>從邊界遞推地紀錄所有問題的解，且一個項用到前一項的最佳結果</a:t>
-            </a:r>
+              <a:rPr lang="zh-TW" altLang="en-US" dirty="0" smtClean="0">
+                <a:solidFill>
+                  <a:schemeClr val="bg1">
+                    <a:lumMod val="75000"/>
+                  </a:schemeClr>
+                </a:solidFill>
+              </a:rPr>
+              <a:t>這</a:t>
+            </a:r>
+            <a:r>
+              <a:rPr lang="zh-TW" altLang="en-US" dirty="0">
+                <a:solidFill>
+                  <a:schemeClr val="bg1">
+                    <a:lumMod val="75000"/>
+                  </a:schemeClr>
+                </a:solidFill>
+              </a:rPr>
+              <a:t>就是在計算前綴和</a:t>
+            </a:r>
+            <a:endParaRPr lang="en-US" altLang="zh-TW" dirty="0">
+              <a:solidFill>
+                <a:schemeClr val="bg1">
+                  <a:lumMod val="75000"/>
+                </a:schemeClr>
+              </a:solidFill>
+            </a:endParaRPr>
+          </a:p>
+          <a:p>
+            <a:pPr marL="0" indent="0">
+              <a:buNone/>
+            </a:pPr>
             <a:endParaRPr lang="en-US" altLang="zh-TW" dirty="0"/>
           </a:p>
         </p:txBody>
@@ -31917,6 +32115,10 @@
             <a:br>
               <a:rPr lang="en-US" altLang="zh-TW" dirty="0"/>
             </a:br>
+            <a:r>
+              <a:rPr lang="en-US" altLang="zh-TW" dirty="0"/>
+              <a:t/>
+            </a:r>
             <a:br>
               <a:rPr lang="en-US" altLang="zh-TW" dirty="0"/>
             </a:br>
@@ -32364,6 +32566,10 @@
             <a:br>
               <a:rPr lang="en-US" altLang="zh-TW" dirty="0"/>
             </a:br>
+            <a:r>
+              <a:rPr lang="en-US" altLang="zh-TW" dirty="0"/>
+              <a:t/>
+            </a:r>
             <a:br>
               <a:rPr lang="en-US" altLang="zh-TW" dirty="0"/>
             </a:br>
@@ -32793,6 +32999,10 @@
             <a:br>
               <a:rPr lang="en-US" altLang="zh-TW" dirty="0"/>
             </a:br>
+            <a:r>
+              <a:rPr lang="en-US" altLang="zh-TW" dirty="0"/>
+              <a:t/>
+            </a:r>
             <a:br>
               <a:rPr lang="en-US" altLang="zh-TW" dirty="0"/>
             </a:br>
@@ -33252,6 +33462,10 @@
             <a:br>
               <a:rPr lang="en-US" altLang="zh-TW" dirty="0"/>
             </a:br>
+            <a:r>
+              <a:rPr lang="en-US" altLang="zh-TW" dirty="0"/>
+              <a:t/>
+            </a:r>
             <a:br>
               <a:rPr lang="en-US" altLang="zh-TW" dirty="0"/>
             </a:br>
@@ -33681,6 +33895,10 @@
             <a:br>
               <a:rPr lang="en-US" altLang="zh-TW" dirty="0"/>
             </a:br>
+            <a:r>
+              <a:rPr lang="en-US" altLang="zh-TW" dirty="0"/>
+              <a:t/>
+            </a:r>
             <a:br>
               <a:rPr lang="en-US" altLang="zh-TW" dirty="0"/>
             </a:br>
@@ -34095,6 +34313,10 @@
             <a:br>
               <a:rPr lang="en-US" altLang="zh-TW" dirty="0"/>
             </a:br>
+            <a:r>
+              <a:rPr lang="en-US" altLang="zh-TW" dirty="0"/>
+              <a:t/>
+            </a:r>
             <a:br>
               <a:rPr lang="en-US" altLang="zh-TW" dirty="0"/>
             </a:br>
@@ -34566,6 +34788,10 @@
             <a:br>
               <a:rPr lang="en-US" altLang="zh-TW" dirty="0"/>
             </a:br>
+            <a:r>
+              <a:rPr lang="en-US" altLang="zh-TW" dirty="0"/>
+              <a:t/>
+            </a:r>
             <a:br>
               <a:rPr lang="en-US" altLang="zh-TW" dirty="0"/>
             </a:br>
@@ -35041,6 +35267,10 @@
             <a:br>
               <a:rPr lang="en-US" altLang="zh-TW" dirty="0"/>
             </a:br>
+            <a:r>
+              <a:rPr lang="en-US" altLang="zh-TW" dirty="0"/>
+              <a:t/>
+            </a:r>
             <a:br>
               <a:rPr lang="en-US" altLang="zh-TW" dirty="0"/>
             </a:br>
@@ -35528,6 +35758,10 @@
             <a:br>
               <a:rPr lang="en-US" altLang="zh-TW" dirty="0"/>
             </a:br>
+            <a:r>
+              <a:rPr lang="en-US" altLang="zh-TW" dirty="0"/>
+              <a:t/>
+            </a:r>
             <a:br>
               <a:rPr lang="en-US" altLang="zh-TW" dirty="0"/>
             </a:br>
@@ -35795,6 +36029,10 @@
             <a:br>
               <a:rPr lang="en-US" altLang="zh-TW" dirty="0"/>
             </a:br>
+            <a:r>
+              <a:rPr lang="en-US" altLang="zh-TW" dirty="0"/>
+              <a:t/>
+            </a:r>
             <a:br>
               <a:rPr lang="en-US" altLang="zh-TW" dirty="0"/>
             </a:br>
@@ -36388,6 +36626,10 @@
             <a:br>
               <a:rPr lang="en-US" altLang="zh-TW" dirty="0"/>
             </a:br>
+            <a:r>
+              <a:rPr lang="en-US" altLang="zh-TW" dirty="0"/>
+              <a:t/>
+            </a:r>
             <a:br>
               <a:rPr lang="en-US" altLang="zh-TW" dirty="0"/>
             </a:br>
@@ -36689,6 +36931,10 @@
             <a:br>
               <a:rPr lang="en-US" altLang="zh-TW" dirty="0"/>
             </a:br>
+            <a:r>
+              <a:rPr lang="en-US" altLang="zh-TW" dirty="0"/>
+              <a:t/>
+            </a:r>
             <a:br>
               <a:rPr lang="en-US" altLang="zh-TW" dirty="0"/>
             </a:br>
@@ -37119,6 +37365,10 @@
             <a:br>
               <a:rPr lang="en-US" altLang="zh-TW" dirty="0"/>
             </a:br>
+            <a:r>
+              <a:rPr lang="en-US" altLang="zh-TW" dirty="0"/>
+              <a:t/>
+            </a:r>
             <a:br>
               <a:rPr lang="en-US" altLang="zh-TW" dirty="0"/>
             </a:br>
@@ -37138,6 +37388,10 @@
             <a:br>
               <a:rPr lang="en-US" altLang="zh-TW" dirty="0"/>
             </a:br>
+            <a:r>
+              <a:rPr lang="en-US" altLang="zh-TW" dirty="0"/>
+              <a:t/>
+            </a:r>
             <a:br>
               <a:rPr lang="en-US" altLang="zh-TW" dirty="0"/>
             </a:br>
@@ -37530,6 +37784,10 @@
             <a:br>
               <a:rPr lang="en-US" altLang="zh-TW" dirty="0"/>
             </a:br>
+            <a:r>
+              <a:rPr lang="en-US" altLang="zh-TW" dirty="0"/>
+              <a:t/>
+            </a:r>
             <a:br>
               <a:rPr lang="en-US" altLang="zh-TW" dirty="0"/>
             </a:br>
@@ -37960,6 +38218,10 @@
             <a:br>
               <a:rPr lang="en-US" altLang="zh-TW" dirty="0"/>
             </a:br>
+            <a:r>
+              <a:rPr lang="en-US" altLang="zh-TW" dirty="0"/>
+              <a:t/>
+            </a:r>
             <a:br>
               <a:rPr lang="en-US" altLang="zh-TW" dirty="0"/>
             </a:br>
@@ -37979,6 +38241,10 @@
             <a:br>
               <a:rPr lang="en-US" altLang="zh-TW" dirty="0"/>
             </a:br>
+            <a:r>
+              <a:rPr lang="en-US" altLang="zh-TW" dirty="0"/>
+              <a:t/>
+            </a:r>
             <a:br>
               <a:rPr lang="en-US" altLang="zh-TW" dirty="0"/>
             </a:br>
@@ -38379,6 +38645,10 @@
             <a:br>
               <a:rPr lang="en-US" altLang="zh-TW" dirty="0"/>
             </a:br>
+            <a:r>
+              <a:rPr lang="en-US" altLang="zh-TW" dirty="0"/>
+              <a:t/>
+            </a:r>
             <a:br>
               <a:rPr lang="en-US" altLang="zh-TW" dirty="0"/>
             </a:br>
@@ -38780,6 +39050,10 @@
             <a:br>
               <a:rPr lang="en-US" altLang="zh-TW" dirty="0"/>
             </a:br>
+            <a:r>
+              <a:rPr lang="en-US" altLang="zh-TW" dirty="0"/>
+              <a:t/>
+            </a:r>
             <a:br>
               <a:rPr lang="en-US" altLang="zh-TW" dirty="0"/>
             </a:br>
@@ -38799,6 +39073,10 @@
             <a:br>
               <a:rPr lang="en-US" altLang="zh-TW" dirty="0"/>
             </a:br>
+            <a:r>
+              <a:rPr lang="en-US" altLang="zh-TW" dirty="0"/>
+              <a:t/>
+            </a:r>
             <a:br>
               <a:rPr lang="en-US" altLang="zh-TW" dirty="0"/>
             </a:br>
@@ -39241,6 +39519,10 @@
             <a:br>
               <a:rPr lang="en-US" altLang="zh-TW" dirty="0"/>
             </a:br>
+            <a:r>
+              <a:rPr lang="en-US" altLang="zh-TW" dirty="0"/>
+              <a:t/>
+            </a:r>
             <a:br>
               <a:rPr lang="en-US" altLang="zh-TW" dirty="0"/>
             </a:br>
@@ -39260,6 +39542,10 @@
             <a:br>
               <a:rPr lang="en-US" altLang="zh-TW" dirty="0"/>
             </a:br>
+            <a:r>
+              <a:rPr lang="en-US" altLang="zh-TW" dirty="0"/>
+              <a:t/>
+            </a:r>
             <a:br>
               <a:rPr lang="en-US" altLang="zh-TW" dirty="0"/>
             </a:br>
@@ -39710,6 +39996,10 @@
             <a:br>
               <a:rPr lang="en-US" altLang="zh-TW" dirty="0"/>
             </a:br>
+            <a:r>
+              <a:rPr lang="en-US" altLang="zh-TW" dirty="0"/>
+              <a:t/>
+            </a:r>
             <a:br>
               <a:rPr lang="en-US" altLang="zh-TW" dirty="0"/>
             </a:br>
@@ -39729,6 +40019,10 @@
             <a:br>
               <a:rPr lang="en-US" altLang="zh-TW" dirty="0"/>
             </a:br>
+            <a:r>
+              <a:rPr lang="en-US" altLang="zh-TW" dirty="0"/>
+              <a:t/>
+            </a:r>
             <a:br>
               <a:rPr lang="en-US" altLang="zh-TW" dirty="0"/>
             </a:br>
@@ -40208,6 +40502,10 @@
             <a:br>
               <a:rPr lang="en-US" altLang="zh-TW" dirty="0"/>
             </a:br>
+            <a:r>
+              <a:rPr lang="en-US" altLang="zh-TW" dirty="0"/>
+              <a:t/>
+            </a:r>
             <a:br>
               <a:rPr lang="en-US" altLang="zh-TW" dirty="0"/>
             </a:br>

</xml_diff>